<commit_message>
some changes - slides
</commit_message>
<xml_diff>
--- a/internal/slides/pptx/Python-Workshop.pptx
+++ b/internal/slides/pptx/Python-Workshop.pptx
@@ -205,7 +205,7 @@
           <a:p>
             <a:fld id="{499A1EE7-0C14-4217-B24D-A63A9E8E2E1B}" type="datetimeFigureOut">
               <a:rPr lang="de-AT" smtClean="0"/>
-              <a:t>29.04.2023</a:t>
+              <a:t>05.05.2023</a:t>
             </a:fld>
             <a:endParaRPr lang="de-AT"/>
           </a:p>
@@ -1566,7 +1566,7 @@
           <a:p>
             <a:fld id="{6337795A-66C8-4B04-9297-31AE65D1A334}" type="datetimeFigureOut">
               <a:rPr lang="en-AU" smtClean="0"/>
-              <a:t>29/04/2023</a:t>
+              <a:t>5/05/2023</a:t>
             </a:fld>
             <a:endParaRPr lang="en-AU"/>
           </a:p>
@@ -1816,7 +1816,7 @@
           <a:p>
             <a:fld id="{6337795A-66C8-4B04-9297-31AE65D1A334}" type="datetimeFigureOut">
               <a:rPr lang="en-AU" smtClean="0"/>
-              <a:t>29/04/2023</a:t>
+              <a:t>5/05/2023</a:t>
             </a:fld>
             <a:endParaRPr lang="en-AU"/>
           </a:p>
@@ -2129,7 +2129,7 @@
           <a:p>
             <a:fld id="{6337795A-66C8-4B04-9297-31AE65D1A334}" type="datetimeFigureOut">
               <a:rPr lang="en-AU" smtClean="0"/>
-              <a:t>29/04/2023</a:t>
+              <a:t>5/05/2023</a:t>
             </a:fld>
             <a:endParaRPr lang="en-AU"/>
           </a:p>
@@ -2455,7 +2455,7 @@
           <a:p>
             <a:fld id="{6337795A-66C8-4B04-9297-31AE65D1A334}" type="datetimeFigureOut">
               <a:rPr lang="en-AU" smtClean="0"/>
-              <a:t>29/04/2023</a:t>
+              <a:t>5/05/2023</a:t>
             </a:fld>
             <a:endParaRPr lang="en-AU"/>
           </a:p>
@@ -2768,7 +2768,7 @@
           <a:p>
             <a:fld id="{6337795A-66C8-4B04-9297-31AE65D1A334}" type="datetimeFigureOut">
               <a:rPr lang="en-AU" smtClean="0"/>
-              <a:t>29/04/2023</a:t>
+              <a:t>5/05/2023</a:t>
             </a:fld>
             <a:endParaRPr lang="en-AU"/>
           </a:p>
@@ -3154,7 +3154,7 @@
           <a:p>
             <a:fld id="{6337795A-66C8-4B04-9297-31AE65D1A334}" type="datetimeFigureOut">
               <a:rPr lang="en-AU" smtClean="0"/>
-              <a:t>29/04/2023</a:t>
+              <a:t>5/05/2023</a:t>
             </a:fld>
             <a:endParaRPr lang="en-AU"/>
           </a:p>
@@ -3322,7 +3322,7 @@
           <a:p>
             <a:fld id="{6337795A-66C8-4B04-9297-31AE65D1A334}" type="datetimeFigureOut">
               <a:rPr lang="en-AU" smtClean="0"/>
-              <a:t>29/04/2023</a:t>
+              <a:t>5/05/2023</a:t>
             </a:fld>
             <a:endParaRPr lang="en-AU"/>
           </a:p>
@@ -3500,7 +3500,7 @@
           <a:p>
             <a:fld id="{6337795A-66C8-4B04-9297-31AE65D1A334}" type="datetimeFigureOut">
               <a:rPr lang="en-AU" smtClean="0"/>
-              <a:t>29/04/2023</a:t>
+              <a:t>5/05/2023</a:t>
             </a:fld>
             <a:endParaRPr lang="en-AU"/>
           </a:p>
@@ -3734,7 +3734,7 @@
           <a:p>
             <a:fld id="{6337795A-66C8-4B04-9297-31AE65D1A334}" type="datetimeFigureOut">
               <a:rPr lang="en-AU" smtClean="0"/>
-              <a:t>29/04/2023</a:t>
+              <a:t>5/05/2023</a:t>
             </a:fld>
             <a:endParaRPr lang="en-AU"/>
           </a:p>
@@ -4059,7 +4059,7 @@
           <a:p>
             <a:fld id="{6337795A-66C8-4B04-9297-31AE65D1A334}" type="datetimeFigureOut">
               <a:rPr lang="en-AU" smtClean="0"/>
-              <a:t>29/04/2023</a:t>
+              <a:t>5/05/2023</a:t>
             </a:fld>
             <a:endParaRPr lang="en-AU"/>
           </a:p>
@@ -4336,7 +4336,7 @@
           <a:p>
             <a:fld id="{6337795A-66C8-4B04-9297-31AE65D1A334}" type="datetimeFigureOut">
               <a:rPr lang="en-AU" smtClean="0"/>
-              <a:t>29/04/2023</a:t>
+              <a:t>5/05/2023</a:t>
             </a:fld>
             <a:endParaRPr lang="en-AU"/>
           </a:p>
@@ -4592,7 +4592,7 @@
           <a:p>
             <a:fld id="{6337795A-66C8-4B04-9297-31AE65D1A334}" type="datetimeFigureOut">
               <a:rPr lang="en-AU" smtClean="0"/>
-              <a:t>29/04/2023</a:t>
+              <a:t>5/05/2023</a:t>
             </a:fld>
             <a:endParaRPr lang="en-AU"/>
           </a:p>
@@ -4869,7 +4869,7 @@
           <a:p>
             <a:fld id="{6337795A-66C8-4B04-9297-31AE65D1A334}" type="datetimeFigureOut">
               <a:rPr lang="en-AU" smtClean="0"/>
-              <a:t>29/04/2023</a:t>
+              <a:t>5/05/2023</a:t>
             </a:fld>
             <a:endParaRPr lang="en-AU"/>
           </a:p>
@@ -5271,7 +5271,7 @@
           <a:p>
             <a:fld id="{6337795A-66C8-4B04-9297-31AE65D1A334}" type="datetimeFigureOut">
               <a:rPr lang="en-AU" smtClean="0"/>
-              <a:t>29/04/2023</a:t>
+              <a:t>5/05/2023</a:t>
             </a:fld>
             <a:endParaRPr lang="en-AU"/>
           </a:p>
@@ -5748,7 +5748,7 @@
           <a:p>
             <a:fld id="{6337795A-66C8-4B04-9297-31AE65D1A334}" type="datetimeFigureOut">
               <a:rPr lang="en-AU" smtClean="0"/>
-              <a:t>29/04/2023</a:t>
+              <a:t>5/05/2023</a:t>
             </a:fld>
             <a:endParaRPr lang="en-AU"/>
           </a:p>
@@ -5866,7 +5866,7 @@
           <a:p>
             <a:fld id="{6337795A-66C8-4B04-9297-31AE65D1A334}" type="datetimeFigureOut">
               <a:rPr lang="en-AU" smtClean="0"/>
-              <a:t>29/04/2023</a:t>
+              <a:t>5/05/2023</a:t>
             </a:fld>
             <a:endParaRPr lang="en-AU"/>
           </a:p>
@@ -5961,7 +5961,7 @@
           <a:p>
             <a:fld id="{6337795A-66C8-4B04-9297-31AE65D1A334}" type="datetimeFigureOut">
               <a:rPr lang="en-AU" smtClean="0"/>
-              <a:t>29/04/2023</a:t>
+              <a:t>5/05/2023</a:t>
             </a:fld>
             <a:endParaRPr lang="en-AU"/>
           </a:p>
@@ -6307,7 +6307,7 @@
           <a:p>
             <a:fld id="{6337795A-66C8-4B04-9297-31AE65D1A334}" type="datetimeFigureOut">
               <a:rPr lang="en-AU" smtClean="0"/>
-              <a:t>29/04/2023</a:t>
+              <a:t>5/05/2023</a:t>
             </a:fld>
             <a:endParaRPr lang="en-AU"/>
           </a:p>
@@ -6695,7 +6695,7 @@
           <a:p>
             <a:fld id="{6337795A-66C8-4B04-9297-31AE65D1A334}" type="datetimeFigureOut">
               <a:rPr lang="en-AU" smtClean="0"/>
-              <a:t>29/04/2023</a:t>
+              <a:t>5/05/2023</a:t>
             </a:fld>
             <a:endParaRPr lang="en-AU"/>
           </a:p>
@@ -6934,7 +6934,7 @@
           <a:p>
             <a:fld id="{6337795A-66C8-4B04-9297-31AE65D1A334}" type="datetimeFigureOut">
               <a:rPr lang="en-AU" smtClean="0"/>
-              <a:t>29/04/2023</a:t>
+              <a:t>5/05/2023</a:t>
             </a:fld>
             <a:endParaRPr lang="en-AU"/>
           </a:p>
@@ -7114,7 +7114,7 @@
           <a:p>
             <a:fld id="{6337795A-66C8-4B04-9297-31AE65D1A334}" type="datetimeFigureOut">
               <a:rPr lang="en-AU" smtClean="0"/>
-              <a:t>29/04/2023</a:t>
+              <a:t>5/05/2023</a:t>
             </a:fld>
             <a:endParaRPr lang="en-AU"/>
           </a:p>
@@ -7360,7 +7360,7 @@
           <a:p>
             <a:fld id="{6337795A-66C8-4B04-9297-31AE65D1A334}" type="datetimeFigureOut">
               <a:rPr lang="en-AU" smtClean="0"/>
-              <a:t>29/04/2023</a:t>
+              <a:t>5/05/2023</a:t>
             </a:fld>
             <a:endParaRPr lang="en-AU"/>
           </a:p>
@@ -7589,7 +7589,7 @@
           <a:p>
             <a:fld id="{6337795A-66C8-4B04-9297-31AE65D1A334}" type="datetimeFigureOut">
               <a:rPr lang="en-AU" smtClean="0"/>
-              <a:t>29/04/2023</a:t>
+              <a:t>5/05/2023</a:t>
             </a:fld>
             <a:endParaRPr lang="en-AU"/>
           </a:p>
@@ -7960,7 +7960,7 @@
           <a:p>
             <a:fld id="{6337795A-66C8-4B04-9297-31AE65D1A334}" type="datetimeFigureOut">
               <a:rPr lang="en-AU" smtClean="0"/>
-              <a:t>29/04/2023</a:t>
+              <a:t>5/05/2023</a:t>
             </a:fld>
             <a:endParaRPr lang="en-AU"/>
           </a:p>
@@ -8082,7 +8082,7 @@
           <a:p>
             <a:fld id="{6337795A-66C8-4B04-9297-31AE65D1A334}" type="datetimeFigureOut">
               <a:rPr lang="en-AU" smtClean="0"/>
-              <a:t>29/04/2023</a:t>
+              <a:t>5/05/2023</a:t>
             </a:fld>
             <a:endParaRPr lang="en-AU"/>
           </a:p>
@@ -8177,7 +8177,7 @@
           <a:p>
             <a:fld id="{6337795A-66C8-4B04-9297-31AE65D1A334}" type="datetimeFigureOut">
               <a:rPr lang="en-AU" smtClean="0"/>
-              <a:t>29/04/2023</a:t>
+              <a:t>5/05/2023</a:t>
             </a:fld>
             <a:endParaRPr lang="en-AU"/>
           </a:p>
@@ -8430,7 +8430,7 @@
           <a:p>
             <a:fld id="{6337795A-66C8-4B04-9297-31AE65D1A334}" type="datetimeFigureOut">
               <a:rPr lang="en-AU" smtClean="0"/>
-              <a:t>29/04/2023</a:t>
+              <a:t>5/05/2023</a:t>
             </a:fld>
             <a:endParaRPr lang="en-AU"/>
           </a:p>
@@ -8691,7 +8691,7 @@
           <a:p>
             <a:fld id="{6337795A-66C8-4B04-9297-31AE65D1A334}" type="datetimeFigureOut">
               <a:rPr lang="en-AU" smtClean="0"/>
-              <a:t>29/04/2023</a:t>
+              <a:t>5/05/2023</a:t>
             </a:fld>
             <a:endParaRPr lang="en-AU"/>
           </a:p>
@@ -9434,7 +9434,7 @@
           <a:p>
             <a:fld id="{6337795A-66C8-4B04-9297-31AE65D1A334}" type="datetimeFigureOut">
               <a:rPr lang="en-AU" smtClean="0"/>
-              <a:t>29/04/2023</a:t>
+              <a:t>5/05/2023</a:t>
             </a:fld>
             <a:endParaRPr lang="en-AU"/>
           </a:p>
@@ -10094,7 +10094,7 @@
           <a:p>
             <a:fld id="{6337795A-66C8-4B04-9297-31AE65D1A334}" type="datetimeFigureOut">
               <a:rPr lang="en-AU" smtClean="0"/>
-              <a:t>29/04/2023</a:t>
+              <a:t>5/05/2023</a:t>
             </a:fld>
             <a:endParaRPr lang="en-AU"/>
           </a:p>
@@ -11700,21 +11700,25 @@
             <a:pPr lvl="1"/>
             <a:r>
               <a:rPr lang="de-AT" dirty="0"/>
-              <a:t>14:00 – Start</a:t>
+              <a:t>15:00 – Start</a:t>
             </a:r>
           </a:p>
           <a:p>
             <a:pPr lvl="2"/>
             <a:r>
               <a:rPr lang="de-AT" dirty="0"/>
-              <a:t>15:30 – Pause </a:t>
+              <a:t>16:30 – Pause </a:t>
             </a:r>
           </a:p>
           <a:p>
             <a:pPr lvl="1"/>
             <a:r>
+              <a:rPr lang="de-AT"/>
+              <a:t>18:15 </a:t>
+            </a:r>
+            <a:r>
               <a:rPr lang="de-AT" dirty="0"/>
-              <a:t>17:15 – Ende </a:t>
+              <a:t>– Ende </a:t>
             </a:r>
           </a:p>
         </p:txBody>

</xml_diff>